<commit_message>
Updated CONOPS illustration so that it has words
</commit_message>
<xml_diff>
--- a/Attitude Determination and Control (ADC)/Delta-V Budgets/Prox Ops Definition Illustrations/Prox Ops Definition Illustration PP.pptx
+++ b/Attitude Determination and Control (ADC)/Delta-V Budgets/Prox Ops Definition Illustrations/Prox Ops Definition Illustration PP.pptx
@@ -291,7 +291,8 @@
           <a:p>
             <a:fld id="{E6FCD21F-04D5-4423-95DF-A3334CBEFC7D}" type="datetimeFigureOut">
               <a:rPr lang="en-US" smtClean="0"/>
-              <a:t>3/4/2014</a:t>
+              <a:pPr/>
+              <a:t>3/10/2014</a:t>
             </a:fld>
             <a:endParaRPr lang="en-US"/>
           </a:p>
@@ -333,6 +334,7 @@
           <a:p>
             <a:fld id="{C7829D3C-CE9F-47FA-950B-F42FA6509B7A}" type="slidenum">
               <a:rPr lang="en-US" smtClean="0"/>
+              <a:pPr/>
               <a:t>‹#›</a:t>
             </a:fld>
             <a:endParaRPr lang="en-US"/>
@@ -456,7 +458,8 @@
           <a:p>
             <a:fld id="{E6FCD21F-04D5-4423-95DF-A3334CBEFC7D}" type="datetimeFigureOut">
               <a:rPr lang="en-US" smtClean="0"/>
-              <a:t>3/4/2014</a:t>
+              <a:pPr/>
+              <a:t>3/10/2014</a:t>
             </a:fld>
             <a:endParaRPr lang="en-US"/>
           </a:p>
@@ -498,6 +501,7 @@
           <a:p>
             <a:fld id="{C7829D3C-CE9F-47FA-950B-F42FA6509B7A}" type="slidenum">
               <a:rPr lang="en-US" smtClean="0"/>
+              <a:pPr/>
               <a:t>‹#›</a:t>
             </a:fld>
             <a:endParaRPr lang="en-US"/>
@@ -631,7 +635,8 @@
           <a:p>
             <a:fld id="{E6FCD21F-04D5-4423-95DF-A3334CBEFC7D}" type="datetimeFigureOut">
               <a:rPr lang="en-US" smtClean="0"/>
-              <a:t>3/4/2014</a:t>
+              <a:pPr/>
+              <a:t>3/10/2014</a:t>
             </a:fld>
             <a:endParaRPr lang="en-US"/>
           </a:p>
@@ -673,6 +678,7 @@
           <a:p>
             <a:fld id="{C7829D3C-CE9F-47FA-950B-F42FA6509B7A}" type="slidenum">
               <a:rPr lang="en-US" smtClean="0"/>
+              <a:pPr/>
               <a:t>‹#›</a:t>
             </a:fld>
             <a:endParaRPr lang="en-US"/>
@@ -796,7 +802,8 @@
           <a:p>
             <a:fld id="{E6FCD21F-04D5-4423-95DF-A3334CBEFC7D}" type="datetimeFigureOut">
               <a:rPr lang="en-US" smtClean="0"/>
-              <a:t>3/4/2014</a:t>
+              <a:pPr/>
+              <a:t>3/10/2014</a:t>
             </a:fld>
             <a:endParaRPr lang="en-US"/>
           </a:p>
@@ -838,6 +845,7 @@
           <a:p>
             <a:fld id="{C7829D3C-CE9F-47FA-950B-F42FA6509B7A}" type="slidenum">
               <a:rPr lang="en-US" smtClean="0"/>
+              <a:pPr/>
               <a:t>‹#›</a:t>
             </a:fld>
             <a:endParaRPr lang="en-US"/>
@@ -1037,7 +1045,8 @@
           <a:p>
             <a:fld id="{E6FCD21F-04D5-4423-95DF-A3334CBEFC7D}" type="datetimeFigureOut">
               <a:rPr lang="en-US" smtClean="0"/>
-              <a:t>3/4/2014</a:t>
+              <a:pPr/>
+              <a:t>3/10/2014</a:t>
             </a:fld>
             <a:endParaRPr lang="en-US"/>
           </a:p>
@@ -1079,6 +1088,7 @@
           <a:p>
             <a:fld id="{C7829D3C-CE9F-47FA-950B-F42FA6509B7A}" type="slidenum">
               <a:rPr lang="en-US" smtClean="0"/>
+              <a:pPr/>
               <a:t>‹#›</a:t>
             </a:fld>
             <a:endParaRPr lang="en-US"/>
@@ -1320,7 +1330,8 @@
           <a:p>
             <a:fld id="{E6FCD21F-04D5-4423-95DF-A3334CBEFC7D}" type="datetimeFigureOut">
               <a:rPr lang="en-US" smtClean="0"/>
-              <a:t>3/4/2014</a:t>
+              <a:pPr/>
+              <a:t>3/10/2014</a:t>
             </a:fld>
             <a:endParaRPr lang="en-US"/>
           </a:p>
@@ -1362,6 +1373,7 @@
           <a:p>
             <a:fld id="{C7829D3C-CE9F-47FA-950B-F42FA6509B7A}" type="slidenum">
               <a:rPr lang="en-US" smtClean="0"/>
+              <a:pPr/>
               <a:t>‹#›</a:t>
             </a:fld>
             <a:endParaRPr lang="en-US"/>
@@ -1737,7 +1749,8 @@
           <a:p>
             <a:fld id="{E6FCD21F-04D5-4423-95DF-A3334CBEFC7D}" type="datetimeFigureOut">
               <a:rPr lang="en-US" smtClean="0"/>
-              <a:t>3/4/2014</a:t>
+              <a:pPr/>
+              <a:t>3/10/2014</a:t>
             </a:fld>
             <a:endParaRPr lang="en-US"/>
           </a:p>
@@ -1779,6 +1792,7 @@
           <a:p>
             <a:fld id="{C7829D3C-CE9F-47FA-950B-F42FA6509B7A}" type="slidenum">
               <a:rPr lang="en-US" smtClean="0"/>
+              <a:pPr/>
               <a:t>‹#›</a:t>
             </a:fld>
             <a:endParaRPr lang="en-US"/>
@@ -1850,7 +1864,8 @@
           <a:p>
             <a:fld id="{E6FCD21F-04D5-4423-95DF-A3334CBEFC7D}" type="datetimeFigureOut">
               <a:rPr lang="en-US" smtClean="0"/>
-              <a:t>3/4/2014</a:t>
+              <a:pPr/>
+              <a:t>3/10/2014</a:t>
             </a:fld>
             <a:endParaRPr lang="en-US"/>
           </a:p>
@@ -1892,6 +1907,7 @@
           <a:p>
             <a:fld id="{C7829D3C-CE9F-47FA-950B-F42FA6509B7A}" type="slidenum">
               <a:rPr lang="en-US" smtClean="0"/>
+              <a:pPr/>
               <a:t>‹#›</a:t>
             </a:fld>
             <a:endParaRPr lang="en-US"/>
@@ -1940,7 +1956,8 @@
           <a:p>
             <a:fld id="{E6FCD21F-04D5-4423-95DF-A3334CBEFC7D}" type="datetimeFigureOut">
               <a:rPr lang="en-US" smtClean="0"/>
-              <a:t>3/4/2014</a:t>
+              <a:pPr/>
+              <a:t>3/10/2014</a:t>
             </a:fld>
             <a:endParaRPr lang="en-US"/>
           </a:p>
@@ -1982,6 +1999,7 @@
           <a:p>
             <a:fld id="{C7829D3C-CE9F-47FA-950B-F42FA6509B7A}" type="slidenum">
               <a:rPr lang="en-US" smtClean="0"/>
+              <a:pPr/>
               <a:t>‹#›</a:t>
             </a:fld>
             <a:endParaRPr lang="en-US"/>
@@ -2212,7 +2230,8 @@
           <a:p>
             <a:fld id="{E6FCD21F-04D5-4423-95DF-A3334CBEFC7D}" type="datetimeFigureOut">
               <a:rPr lang="en-US" smtClean="0"/>
-              <a:t>3/4/2014</a:t>
+              <a:pPr/>
+              <a:t>3/10/2014</a:t>
             </a:fld>
             <a:endParaRPr lang="en-US"/>
           </a:p>
@@ -2254,6 +2273,7 @@
           <a:p>
             <a:fld id="{C7829D3C-CE9F-47FA-950B-F42FA6509B7A}" type="slidenum">
               <a:rPr lang="en-US" smtClean="0"/>
+              <a:pPr/>
               <a:t>‹#›</a:t>
             </a:fld>
             <a:endParaRPr lang="en-US"/>
@@ -2460,7 +2480,8 @@
           <a:p>
             <a:fld id="{E6FCD21F-04D5-4423-95DF-A3334CBEFC7D}" type="datetimeFigureOut">
               <a:rPr lang="en-US" smtClean="0"/>
-              <a:t>3/4/2014</a:t>
+              <a:pPr/>
+              <a:t>3/10/2014</a:t>
             </a:fld>
             <a:endParaRPr lang="en-US"/>
           </a:p>
@@ -2502,6 +2523,7 @@
           <a:p>
             <a:fld id="{C7829D3C-CE9F-47FA-950B-F42FA6509B7A}" type="slidenum">
               <a:rPr lang="en-US" smtClean="0"/>
+              <a:pPr/>
               <a:t>‹#›</a:t>
             </a:fld>
             <a:endParaRPr lang="en-US"/>
@@ -2668,7 +2690,8 @@
           <a:p>
             <a:fld id="{E6FCD21F-04D5-4423-95DF-A3334CBEFC7D}" type="datetimeFigureOut">
               <a:rPr lang="en-US" smtClean="0"/>
-              <a:t>3/4/2014</a:t>
+              <a:pPr/>
+              <a:t>3/10/2014</a:t>
             </a:fld>
             <a:endParaRPr lang="en-US"/>
           </a:p>
@@ -2746,6 +2769,7 @@
           <a:p>
             <a:fld id="{C7829D3C-CE9F-47FA-950B-F42FA6509B7A}" type="slidenum">
               <a:rPr lang="en-US" smtClean="0"/>
+              <a:pPr/>
               <a:t>‹#›</a:t>
             </a:fld>
             <a:endParaRPr lang="en-US"/>
@@ -3197,8 +3221,8 @@
           <p:nvPr/>
         </p:nvSpPr>
         <p:spPr>
-          <a:xfrm rot="18900000">
-            <a:off x="6547124" y="1890006"/>
+          <a:xfrm rot="13440000">
+            <a:off x="6696575" y="1766508"/>
             <a:ext cx="132434" cy="397920"/>
           </a:xfrm>
           <a:prstGeom prst="rect">

</xml_diff>

<commit_message>
Updated coordinate illustration for Prox ops illustrations
</commit_message>
<xml_diff>
--- a/Attitude Determination and Control (ADC)/Delta-V Budgets/Prox Ops Definition Illustrations/Prox Ops Definition Illustration PP.pptx
+++ b/Attitude Determination and Control (ADC)/Delta-V Budgets/Prox Ops Definition Illustrations/Prox Ops Definition Illustration PP.pptx
@@ -292,7 +292,7 @@
             <a:fld id="{E6FCD21F-04D5-4423-95DF-A3334CBEFC7D}" type="datetimeFigureOut">
               <a:rPr lang="en-US" smtClean="0"/>
               <a:pPr/>
-              <a:t>3/10/2014</a:t>
+              <a:t>3/21/2014</a:t>
             </a:fld>
             <a:endParaRPr lang="en-US"/>
           </a:p>
@@ -459,7 +459,7 @@
             <a:fld id="{E6FCD21F-04D5-4423-95DF-A3334CBEFC7D}" type="datetimeFigureOut">
               <a:rPr lang="en-US" smtClean="0"/>
               <a:pPr/>
-              <a:t>3/10/2014</a:t>
+              <a:t>3/21/2014</a:t>
             </a:fld>
             <a:endParaRPr lang="en-US"/>
           </a:p>
@@ -636,7 +636,7 @@
             <a:fld id="{E6FCD21F-04D5-4423-95DF-A3334CBEFC7D}" type="datetimeFigureOut">
               <a:rPr lang="en-US" smtClean="0"/>
               <a:pPr/>
-              <a:t>3/10/2014</a:t>
+              <a:t>3/21/2014</a:t>
             </a:fld>
             <a:endParaRPr lang="en-US"/>
           </a:p>
@@ -803,7 +803,7 @@
             <a:fld id="{E6FCD21F-04D5-4423-95DF-A3334CBEFC7D}" type="datetimeFigureOut">
               <a:rPr lang="en-US" smtClean="0"/>
               <a:pPr/>
-              <a:t>3/10/2014</a:t>
+              <a:t>3/21/2014</a:t>
             </a:fld>
             <a:endParaRPr lang="en-US"/>
           </a:p>
@@ -1046,7 +1046,7 @@
             <a:fld id="{E6FCD21F-04D5-4423-95DF-A3334CBEFC7D}" type="datetimeFigureOut">
               <a:rPr lang="en-US" smtClean="0"/>
               <a:pPr/>
-              <a:t>3/10/2014</a:t>
+              <a:t>3/21/2014</a:t>
             </a:fld>
             <a:endParaRPr lang="en-US"/>
           </a:p>
@@ -1331,7 +1331,7 @@
             <a:fld id="{E6FCD21F-04D5-4423-95DF-A3334CBEFC7D}" type="datetimeFigureOut">
               <a:rPr lang="en-US" smtClean="0"/>
               <a:pPr/>
-              <a:t>3/10/2014</a:t>
+              <a:t>3/21/2014</a:t>
             </a:fld>
             <a:endParaRPr lang="en-US"/>
           </a:p>
@@ -1750,7 +1750,7 @@
             <a:fld id="{E6FCD21F-04D5-4423-95DF-A3334CBEFC7D}" type="datetimeFigureOut">
               <a:rPr lang="en-US" smtClean="0"/>
               <a:pPr/>
-              <a:t>3/10/2014</a:t>
+              <a:t>3/21/2014</a:t>
             </a:fld>
             <a:endParaRPr lang="en-US"/>
           </a:p>
@@ -1865,7 +1865,7 @@
             <a:fld id="{E6FCD21F-04D5-4423-95DF-A3334CBEFC7D}" type="datetimeFigureOut">
               <a:rPr lang="en-US" smtClean="0"/>
               <a:pPr/>
-              <a:t>3/10/2014</a:t>
+              <a:t>3/21/2014</a:t>
             </a:fld>
             <a:endParaRPr lang="en-US"/>
           </a:p>
@@ -1957,7 +1957,7 @@
             <a:fld id="{E6FCD21F-04D5-4423-95DF-A3334CBEFC7D}" type="datetimeFigureOut">
               <a:rPr lang="en-US" smtClean="0"/>
               <a:pPr/>
-              <a:t>3/10/2014</a:t>
+              <a:t>3/21/2014</a:t>
             </a:fld>
             <a:endParaRPr lang="en-US"/>
           </a:p>
@@ -2231,7 +2231,7 @@
             <a:fld id="{E6FCD21F-04D5-4423-95DF-A3334CBEFC7D}" type="datetimeFigureOut">
               <a:rPr lang="en-US" smtClean="0"/>
               <a:pPr/>
-              <a:t>3/10/2014</a:t>
+              <a:t>3/21/2014</a:t>
             </a:fld>
             <a:endParaRPr lang="en-US"/>
           </a:p>
@@ -2481,7 +2481,7 @@
             <a:fld id="{E6FCD21F-04D5-4423-95DF-A3334CBEFC7D}" type="datetimeFigureOut">
               <a:rPr lang="en-US" smtClean="0"/>
               <a:pPr/>
-              <a:t>3/10/2014</a:t>
+              <a:t>3/21/2014</a:t>
             </a:fld>
             <a:endParaRPr lang="en-US"/>
           </a:p>
@@ -2691,7 +2691,7 @@
             <a:fld id="{E6FCD21F-04D5-4423-95DF-A3334CBEFC7D}" type="datetimeFigureOut">
               <a:rPr lang="en-US" smtClean="0"/>
               <a:pPr/>
-              <a:t>3/10/2014</a:t>
+              <a:t>3/21/2014</a:t>
             </a:fld>
             <a:endParaRPr lang="en-US"/>
           </a:p>
@@ -4052,7 +4052,21 @@
                 <a:latin typeface="Times New Roman" pitchFamily="18" charset="0"/>
                 <a:cs typeface="Times New Roman" pitchFamily="18" charset="0"/>
               </a:rPr>
-              <a:t>“In Track”</a:t>
+              <a:t>“</a:t>
+            </a:r>
+            <a:r>
+              <a:rPr lang="en-US" sz="1400" dirty="0" smtClean="0">
+                <a:latin typeface="Times New Roman" pitchFamily="18" charset="0"/>
+                <a:cs typeface="Times New Roman" pitchFamily="18" charset="0"/>
+              </a:rPr>
+              <a:t>In-Track</a:t>
+            </a:r>
+            <a:r>
+              <a:rPr lang="en-US" sz="1400" dirty="0" smtClean="0">
+                <a:latin typeface="Times New Roman" pitchFamily="18" charset="0"/>
+                <a:cs typeface="Times New Roman" pitchFamily="18" charset="0"/>
+              </a:rPr>
+              <a:t>”</a:t>
             </a:r>
             <a:endParaRPr lang="en-US" sz="1400" dirty="0">
               <a:latin typeface="Times New Roman" pitchFamily="18" charset="0"/>
@@ -4095,11 +4109,25 @@
           <a:p>
             <a:pPr algn="ctr"/>
             <a:r>
+              <a:rPr lang="en-US" sz="1400" smtClean="0">
+                <a:latin typeface="Times New Roman" pitchFamily="18" charset="0"/>
+                <a:cs typeface="Times New Roman" pitchFamily="18" charset="0"/>
+              </a:rPr>
+              <a:t>“</a:t>
+            </a:r>
+            <a:r>
+              <a:rPr lang="en-US" sz="1400" smtClean="0">
+                <a:latin typeface="Times New Roman" pitchFamily="18" charset="0"/>
+                <a:cs typeface="Times New Roman" pitchFamily="18" charset="0"/>
+              </a:rPr>
+              <a:t>Out-of-Plane</a:t>
+            </a:r>
+            <a:r>
               <a:rPr lang="en-US" sz="1400" dirty="0" smtClean="0">
                 <a:latin typeface="Times New Roman" pitchFamily="18" charset="0"/>
                 <a:cs typeface="Times New Roman" pitchFamily="18" charset="0"/>
               </a:rPr>
-              <a:t>“Out of Plane”</a:t>
+              <a:t>”</a:t>
             </a:r>
             <a:endParaRPr lang="en-US" sz="1400" dirty="0">
               <a:latin typeface="Times New Roman" pitchFamily="18" charset="0"/>
@@ -4146,7 +4174,14 @@
                 <a:latin typeface="Times New Roman" pitchFamily="18" charset="0"/>
                 <a:cs typeface="Times New Roman" pitchFamily="18" charset="0"/>
               </a:rPr>
-              <a:t>“Out of Track”</a:t>
+              <a:t>“Cross-Track</a:t>
+            </a:r>
+            <a:r>
+              <a:rPr lang="en-US" sz="1400" dirty="0" smtClean="0">
+                <a:latin typeface="Times New Roman" pitchFamily="18" charset="0"/>
+                <a:cs typeface="Times New Roman" pitchFamily="18" charset="0"/>
+              </a:rPr>
+              <a:t>”</a:t>
             </a:r>
             <a:endParaRPr lang="en-US" sz="1400" dirty="0">
               <a:latin typeface="Times New Roman" pitchFamily="18" charset="0"/>

</xml_diff>